<commit_message>
Updated architecture slides and png.
</commit_message>
<xml_diff>
--- a/docs/deployment_guide/images/architecture_diagram.pptx
+++ b/docs/deployment_guide/images/architecture_diagram.pptx
@@ -223,7 +223,7 @@
           <a:p>
             <a:fld id="{49A7721D-1176-A640-AC48-B82F78C92D56}" type="datetimeFigureOut">
               <a:rPr lang="en-US" smtClean="0"/>
-              <a:t>2022-03-31</a:t>
+              <a:t>4/7/22</a:t>
             </a:fld>
             <a:endParaRPr lang="en-US" dirty="0"/>
           </a:p>
@@ -400,7 +400,7 @@
           <a:p>
             <a:fld id="{C884A089-FB25-6D46-9D21-F0F04A18BCA8}" type="datetimeFigureOut">
               <a:rPr lang="en-US" smtClean="0"/>
-              <a:t>2022-03-31</a:t>
+              <a:t>4/7/22</a:t>
             </a:fld>
             <a:endParaRPr lang="en-US" dirty="0"/>
           </a:p>
@@ -1623,8 +1623,8 @@
         </p:nvSpPr>
         <p:spPr>
           <a:xfrm>
-            <a:off x="5776585" y="762368"/>
-            <a:ext cx="6824890" cy="5613395"/>
+            <a:off x="5795609" y="103909"/>
+            <a:ext cx="6377585" cy="6736352"/>
           </a:xfrm>
           <a:prstGeom prst="rect">
             <a:avLst/>
@@ -1703,7 +1703,7 @@
         </p:blipFill>
         <p:spPr>
           <a:xfrm>
-            <a:off x="5776586" y="765092"/>
+            <a:off x="5795609" y="93518"/>
             <a:ext cx="300391" cy="330200"/>
           </a:xfrm>
           <a:prstGeom prst="rect">
@@ -2283,7 +2283,7 @@
         </p:nvSpPr>
         <p:spPr>
           <a:xfrm>
-            <a:off x="9427863" y="2542295"/>
+            <a:off x="9356326" y="2479581"/>
             <a:ext cx="323190" cy="313509"/>
           </a:xfrm>
           <a:prstGeom prst="ellipse">
@@ -2625,7 +2625,7 @@
         </p:nvSpPr>
         <p:spPr bwMode="auto">
           <a:xfrm>
-            <a:off x="9607572" y="2466621"/>
+            <a:off x="8765348" y="2870106"/>
             <a:ext cx="1512049" cy="261610"/>
           </a:xfrm>
           <a:prstGeom prst="rect">
@@ -2797,7 +2797,7 @@
         </p:blipFill>
         <p:spPr bwMode="auto">
           <a:xfrm>
-            <a:off x="10093817" y="2758653"/>
+            <a:off x="9251593" y="3162138"/>
             <a:ext cx="457200" cy="457200"/>
           </a:xfrm>
           <a:prstGeom prst="rect">
@@ -3646,6 +3646,1204 @@
           </a:fontRef>
         </p:style>
       </p:cxnSp>
+      <p:pic>
+        <p:nvPicPr>
+          <p:cNvPr id="35" name="Graphic 17">
+            <a:extLst>
+              <a:ext uri="{FF2B5EF4-FFF2-40B4-BE49-F238E27FC236}">
+                <a16:creationId xmlns:a16="http://schemas.microsoft.com/office/drawing/2014/main" id="{B60D8445-5256-5E47-94F1-DE8D895CE080}"/>
+              </a:ext>
+            </a:extLst>
+          </p:cNvPr>
+          <p:cNvPicPr>
+            <a:picLocks noChangeAspect="1" noChangeArrowheads="1"/>
+          </p:cNvPicPr>
+          <p:nvPr/>
+        </p:nvPicPr>
+        <p:blipFill>
+          <a:blip r:embed="rId15">
+            <a:extLst>
+              <a:ext uri="{28A0092B-C50C-407E-A947-70E740481C1C}">
+                <a14:useLocalDpi xmlns:a14="http://schemas.microsoft.com/office/drawing/2010/main" val="0"/>
+              </a:ext>
+            </a:extLst>
+          </a:blip>
+          <a:srcRect/>
+          <a:stretch>
+            <a:fillRect/>
+          </a:stretch>
+        </p:blipFill>
+        <p:spPr bwMode="auto">
+          <a:xfrm>
+            <a:off x="10805692" y="2206383"/>
+            <a:ext cx="762000" cy="762000"/>
+          </a:xfrm>
+          <a:prstGeom prst="rect">
+            <a:avLst/>
+          </a:prstGeom>
+          <a:noFill/>
+          <a:ln>
+            <a:noFill/>
+          </a:ln>
+          <a:extLst>
+            <a:ext uri="{909E8E84-426E-40DD-AFC4-6F175D3DCCD1}">
+              <a14:hiddenFill xmlns:a14="http://schemas.microsoft.com/office/drawing/2010/main">
+                <a:solidFill>
+                  <a:srgbClr val="FFFFFF"/>
+                </a:solidFill>
+              </a14:hiddenFill>
+            </a:ext>
+            <a:ext uri="{91240B29-F687-4F45-9708-019B960494DF}">
+              <a14:hiddenLine xmlns:a14="http://schemas.microsoft.com/office/drawing/2010/main" w="9525">
+                <a:solidFill>
+                  <a:srgbClr val="000000"/>
+                </a:solidFill>
+                <a:miter lim="800000"/>
+                <a:headEnd/>
+                <a:tailEnd/>
+              </a14:hiddenLine>
+            </a:ext>
+          </a:extLst>
+        </p:spPr>
+      </p:pic>
+      <p:sp>
+        <p:nvSpPr>
+          <p:cNvPr id="36" name="TextBox 9">
+            <a:extLst>
+              <a:ext uri="{FF2B5EF4-FFF2-40B4-BE49-F238E27FC236}">
+                <a16:creationId xmlns:a16="http://schemas.microsoft.com/office/drawing/2014/main" id="{765BABE5-83F0-D441-AE92-FAFD3F7DAE0A}"/>
+              </a:ext>
+            </a:extLst>
+          </p:cNvPr>
+          <p:cNvSpPr txBox="1">
+            <a:spLocks noChangeArrowheads="1"/>
+          </p:cNvSpPr>
+          <p:nvPr/>
+        </p:nvSpPr>
+        <p:spPr bwMode="auto">
+          <a:xfrm>
+            <a:off x="10065917" y="2968383"/>
+            <a:ext cx="2243137" cy="276999"/>
+          </a:xfrm>
+          <a:prstGeom prst="rect">
+            <a:avLst/>
+          </a:prstGeom>
+          <a:noFill/>
+          <a:ln>
+            <a:noFill/>
+          </a:ln>
+          <a:extLst>
+            <a:ext uri="{909E8E84-426E-40DD-AFC4-6F175D3DCCD1}">
+              <a14:hiddenFill xmlns:a14="http://schemas.microsoft.com/office/drawing/2010/main">
+                <a:solidFill>
+                  <a:srgbClr val="FFFFFF"/>
+                </a:solidFill>
+              </a14:hiddenFill>
+            </a:ext>
+            <a:ext uri="{91240B29-F687-4F45-9708-019B960494DF}">
+              <a14:hiddenLine xmlns:a14="http://schemas.microsoft.com/office/drawing/2010/main" w="9525">
+                <a:solidFill>
+                  <a:srgbClr val="000000"/>
+                </a:solidFill>
+                <a:miter lim="800000"/>
+                <a:headEnd/>
+                <a:tailEnd/>
+              </a14:hiddenLine>
+            </a:ext>
+          </a:extLst>
+        </p:spPr>
+        <p:txBody>
+          <a:bodyPr>
+            <a:spAutoFit/>
+          </a:bodyPr>
+          <a:lstStyle>
+            <a:lvl1pPr>
+              <a:defRPr>
+                <a:solidFill>
+                  <a:schemeClr val="tx1"/>
+                </a:solidFill>
+                <a:latin typeface="Calibri" panose="020F0502020204030204" pitchFamily="34" charset="0"/>
+              </a:defRPr>
+            </a:lvl1pPr>
+            <a:lvl2pPr marL="742950" indent="-285750">
+              <a:defRPr>
+                <a:solidFill>
+                  <a:schemeClr val="tx1"/>
+                </a:solidFill>
+                <a:latin typeface="Calibri" panose="020F0502020204030204" pitchFamily="34" charset="0"/>
+              </a:defRPr>
+            </a:lvl2pPr>
+            <a:lvl3pPr marL="1143000" indent="-228600">
+              <a:defRPr>
+                <a:solidFill>
+                  <a:schemeClr val="tx1"/>
+                </a:solidFill>
+                <a:latin typeface="Calibri" panose="020F0502020204030204" pitchFamily="34" charset="0"/>
+              </a:defRPr>
+            </a:lvl3pPr>
+            <a:lvl4pPr marL="1600200" indent="-228600">
+              <a:defRPr>
+                <a:solidFill>
+                  <a:schemeClr val="tx1"/>
+                </a:solidFill>
+                <a:latin typeface="Calibri" panose="020F0502020204030204" pitchFamily="34" charset="0"/>
+              </a:defRPr>
+            </a:lvl4pPr>
+            <a:lvl5pPr marL="2057400" indent="-228600">
+              <a:defRPr>
+                <a:solidFill>
+                  <a:schemeClr val="tx1"/>
+                </a:solidFill>
+                <a:latin typeface="Calibri" panose="020F0502020204030204" pitchFamily="34" charset="0"/>
+              </a:defRPr>
+            </a:lvl5pPr>
+            <a:lvl6pPr marL="2514600" indent="-228600" eaLnBrk="0" fontAlgn="base" hangingPunct="0">
+              <a:spcBef>
+                <a:spcPct val="0"/>
+              </a:spcBef>
+              <a:spcAft>
+                <a:spcPct val="0"/>
+              </a:spcAft>
+              <a:defRPr>
+                <a:solidFill>
+                  <a:schemeClr val="tx1"/>
+                </a:solidFill>
+                <a:latin typeface="Calibri" panose="020F0502020204030204" pitchFamily="34" charset="0"/>
+              </a:defRPr>
+            </a:lvl6pPr>
+            <a:lvl7pPr marL="2971800" indent="-228600" eaLnBrk="0" fontAlgn="base" hangingPunct="0">
+              <a:spcBef>
+                <a:spcPct val="0"/>
+              </a:spcBef>
+              <a:spcAft>
+                <a:spcPct val="0"/>
+              </a:spcAft>
+              <a:defRPr>
+                <a:solidFill>
+                  <a:schemeClr val="tx1"/>
+                </a:solidFill>
+                <a:latin typeface="Calibri" panose="020F0502020204030204" pitchFamily="34" charset="0"/>
+              </a:defRPr>
+            </a:lvl7pPr>
+            <a:lvl8pPr marL="3429000" indent="-228600" eaLnBrk="0" fontAlgn="base" hangingPunct="0">
+              <a:spcBef>
+                <a:spcPct val="0"/>
+              </a:spcBef>
+              <a:spcAft>
+                <a:spcPct val="0"/>
+              </a:spcAft>
+              <a:defRPr>
+                <a:solidFill>
+                  <a:schemeClr val="tx1"/>
+                </a:solidFill>
+                <a:latin typeface="Calibri" panose="020F0502020204030204" pitchFamily="34" charset="0"/>
+              </a:defRPr>
+            </a:lvl8pPr>
+            <a:lvl9pPr marL="3886200" indent="-228600" eaLnBrk="0" fontAlgn="base" hangingPunct="0">
+              <a:spcBef>
+                <a:spcPct val="0"/>
+              </a:spcBef>
+              <a:spcAft>
+                <a:spcPct val="0"/>
+              </a:spcAft>
+              <a:defRPr>
+                <a:solidFill>
+                  <a:schemeClr val="tx1"/>
+                </a:solidFill>
+                <a:latin typeface="Calibri" panose="020F0502020204030204" pitchFamily="34" charset="0"/>
+              </a:defRPr>
+            </a:lvl9pPr>
+          </a:lstStyle>
+          <a:p>
+            <a:pPr algn="ctr" eaLnBrk="1" hangingPunct="1"/>
+            <a:r>
+              <a:rPr lang="en-US" altLang="en-US" sz="1200" dirty="0">
+                <a:latin typeface="Arial" panose="020B0604020202020204" pitchFamily="34" charset="0"/>
+                <a:ea typeface="Amazon Ember" panose="020B0603020204020204" pitchFamily="34" charset="0"/>
+                <a:cs typeface="Arial" panose="020B0604020202020204" pitchFamily="34" charset="0"/>
+              </a:rPr>
+              <a:t>Amazon CloudWatch</a:t>
+            </a:r>
+          </a:p>
+        </p:txBody>
+      </p:sp>
+      <p:cxnSp>
+        <p:nvCxnSpPr>
+          <p:cNvPr id="3" name="Straight Connector 2">
+            <a:extLst>
+              <a:ext uri="{FF2B5EF4-FFF2-40B4-BE49-F238E27FC236}">
+                <a16:creationId xmlns:a16="http://schemas.microsoft.com/office/drawing/2014/main" id="{22B8B92C-3EA3-364D-BC46-C4EBE553885C}"/>
+              </a:ext>
+            </a:extLst>
+          </p:cNvPr>
+          <p:cNvCxnSpPr>
+            <a:stCxn id="105" idx="0"/>
+            <a:endCxn id="36" idx="2"/>
+          </p:cNvCxnSpPr>
+          <p:nvPr/>
+        </p:nvCxnSpPr>
+        <p:spPr>
+          <a:xfrm flipV="1">
+            <a:off x="11186692" y="3245382"/>
+            <a:ext cx="794" cy="1072851"/>
+          </a:xfrm>
+          <a:prstGeom prst="line">
+            <a:avLst/>
+          </a:prstGeom>
+          <a:ln w="12700">
+            <a:solidFill>
+              <a:schemeClr val="accent1"/>
+            </a:solidFill>
+            <a:headEnd type="none" w="med" len="sm"/>
+            <a:tailEnd type="none" w="med" len="sm"/>
+          </a:ln>
+        </p:spPr>
+        <p:style>
+          <a:lnRef idx="1">
+            <a:schemeClr val="accent1"/>
+          </a:lnRef>
+          <a:fillRef idx="0">
+            <a:schemeClr val="accent1"/>
+          </a:fillRef>
+          <a:effectRef idx="0">
+            <a:schemeClr val="accent1"/>
+          </a:effectRef>
+          <a:fontRef idx="minor">
+            <a:schemeClr val="tx1"/>
+          </a:fontRef>
+        </p:style>
+      </p:cxnSp>
+      <p:pic>
+        <p:nvPicPr>
+          <p:cNvPr id="53" name="Graphic 6">
+            <a:extLst>
+              <a:ext uri="{FF2B5EF4-FFF2-40B4-BE49-F238E27FC236}">
+                <a16:creationId xmlns:a16="http://schemas.microsoft.com/office/drawing/2014/main" id="{91FD1091-3BC4-7E46-A98D-22801037C7B0}"/>
+              </a:ext>
+            </a:extLst>
+          </p:cNvPr>
+          <p:cNvPicPr>
+            <a:picLocks noChangeAspect="1" noChangeArrowheads="1"/>
+          </p:cNvPicPr>
+          <p:nvPr/>
+        </p:nvPicPr>
+        <p:blipFill>
+          <a:blip r:embed="rId16">
+            <a:extLst>
+              <a:ext uri="{28A0092B-C50C-407E-A947-70E740481C1C}">
+                <a14:useLocalDpi xmlns:a14="http://schemas.microsoft.com/office/drawing/2010/main" val="0"/>
+              </a:ext>
+            </a:extLst>
+          </a:blip>
+          <a:srcRect/>
+          <a:stretch>
+            <a:fillRect/>
+          </a:stretch>
+        </p:blipFill>
+        <p:spPr bwMode="auto">
+          <a:xfrm>
+            <a:off x="11259218" y="3266467"/>
+            <a:ext cx="457200" cy="457200"/>
+          </a:xfrm>
+          <a:prstGeom prst="rect">
+            <a:avLst/>
+          </a:prstGeom>
+          <a:noFill/>
+          <a:ln>
+            <a:noFill/>
+          </a:ln>
+          <a:extLst>
+            <a:ext uri="{909E8E84-426E-40DD-AFC4-6F175D3DCCD1}">
+              <a14:hiddenFill xmlns:a14="http://schemas.microsoft.com/office/drawing/2010/main">
+                <a:solidFill>
+                  <a:srgbClr val="FFFFFF"/>
+                </a:solidFill>
+              </a14:hiddenFill>
+            </a:ext>
+            <a:ext uri="{91240B29-F687-4F45-9708-019B960494DF}">
+              <a14:hiddenLine xmlns:a14="http://schemas.microsoft.com/office/drawing/2010/main" w="9525">
+                <a:solidFill>
+                  <a:srgbClr val="000000"/>
+                </a:solidFill>
+                <a:miter lim="800000"/>
+                <a:headEnd/>
+                <a:tailEnd/>
+              </a14:hiddenLine>
+            </a:ext>
+          </a:extLst>
+        </p:spPr>
+      </p:pic>
+      <p:pic>
+        <p:nvPicPr>
+          <p:cNvPr id="54" name="Graphic 7">
+            <a:extLst>
+              <a:ext uri="{FF2B5EF4-FFF2-40B4-BE49-F238E27FC236}">
+                <a16:creationId xmlns:a16="http://schemas.microsoft.com/office/drawing/2014/main" id="{EB9E0FBA-7D8A-9240-97E9-C4F854EA5F7D}"/>
+              </a:ext>
+            </a:extLst>
+          </p:cNvPr>
+          <p:cNvPicPr>
+            <a:picLocks noChangeAspect="1" noChangeArrowheads="1"/>
+          </p:cNvPicPr>
+          <p:nvPr/>
+        </p:nvPicPr>
+        <p:blipFill>
+          <a:blip r:embed="rId17">
+            <a:extLst>
+              <a:ext uri="{28A0092B-C50C-407E-A947-70E740481C1C}">
+                <a14:useLocalDpi xmlns:a14="http://schemas.microsoft.com/office/drawing/2010/main" val="0"/>
+              </a:ext>
+            </a:extLst>
+          </a:blip>
+          <a:srcRect/>
+          <a:stretch>
+            <a:fillRect/>
+          </a:stretch>
+        </p:blipFill>
+        <p:spPr bwMode="auto">
+          <a:xfrm>
+            <a:off x="10805692" y="5615009"/>
+            <a:ext cx="762000" cy="762000"/>
+          </a:xfrm>
+          <a:prstGeom prst="rect">
+            <a:avLst/>
+          </a:prstGeom>
+          <a:noFill/>
+          <a:ln>
+            <a:noFill/>
+          </a:ln>
+          <a:extLst>
+            <a:ext uri="{909E8E84-426E-40DD-AFC4-6F175D3DCCD1}">
+              <a14:hiddenFill xmlns:a14="http://schemas.microsoft.com/office/drawing/2010/main">
+                <a:solidFill>
+                  <a:srgbClr val="FFFFFF"/>
+                </a:solidFill>
+              </a14:hiddenFill>
+            </a:ext>
+            <a:ext uri="{91240B29-F687-4F45-9708-019B960494DF}">
+              <a14:hiddenLine xmlns:a14="http://schemas.microsoft.com/office/drawing/2010/main" w="9525">
+                <a:solidFill>
+                  <a:srgbClr val="000000"/>
+                </a:solidFill>
+                <a:miter lim="800000"/>
+                <a:headEnd/>
+                <a:tailEnd/>
+              </a14:hiddenLine>
+            </a:ext>
+          </a:extLst>
+        </p:spPr>
+      </p:pic>
+      <p:sp>
+        <p:nvSpPr>
+          <p:cNvPr id="55" name="TextBox 9">
+            <a:extLst>
+              <a:ext uri="{FF2B5EF4-FFF2-40B4-BE49-F238E27FC236}">
+                <a16:creationId xmlns:a16="http://schemas.microsoft.com/office/drawing/2014/main" id="{8EDB01EF-7CE3-7342-80A7-F8A506896075}"/>
+              </a:ext>
+            </a:extLst>
+          </p:cNvPr>
+          <p:cNvSpPr txBox="1">
+            <a:spLocks noChangeArrowheads="1"/>
+          </p:cNvSpPr>
+          <p:nvPr/>
+        </p:nvSpPr>
+        <p:spPr bwMode="auto">
+          <a:xfrm>
+            <a:off x="10065917" y="6378596"/>
+            <a:ext cx="2243137" cy="461665"/>
+          </a:xfrm>
+          <a:prstGeom prst="rect">
+            <a:avLst/>
+          </a:prstGeom>
+          <a:noFill/>
+          <a:ln>
+            <a:noFill/>
+          </a:ln>
+          <a:extLst>
+            <a:ext uri="{909E8E84-426E-40DD-AFC4-6F175D3DCCD1}">
+              <a14:hiddenFill xmlns:a14="http://schemas.microsoft.com/office/drawing/2010/main">
+                <a:solidFill>
+                  <a:srgbClr val="FFFFFF"/>
+                </a:solidFill>
+              </a14:hiddenFill>
+            </a:ext>
+            <a:ext uri="{91240B29-F687-4F45-9708-019B960494DF}">
+              <a14:hiddenLine xmlns:a14="http://schemas.microsoft.com/office/drawing/2010/main" w="9525">
+                <a:solidFill>
+                  <a:srgbClr val="000000"/>
+                </a:solidFill>
+                <a:miter lim="800000"/>
+                <a:headEnd/>
+                <a:tailEnd/>
+              </a14:hiddenLine>
+            </a:ext>
+          </a:extLst>
+        </p:spPr>
+        <p:txBody>
+          <a:bodyPr>
+            <a:spAutoFit/>
+          </a:bodyPr>
+          <a:lstStyle>
+            <a:lvl1pPr>
+              <a:defRPr>
+                <a:solidFill>
+                  <a:schemeClr val="tx1"/>
+                </a:solidFill>
+                <a:latin typeface="Calibri" panose="020F0502020204030204" pitchFamily="34" charset="0"/>
+              </a:defRPr>
+            </a:lvl1pPr>
+            <a:lvl2pPr marL="742950" indent="-285750">
+              <a:defRPr>
+                <a:solidFill>
+                  <a:schemeClr val="tx1"/>
+                </a:solidFill>
+                <a:latin typeface="Calibri" panose="020F0502020204030204" pitchFamily="34" charset="0"/>
+              </a:defRPr>
+            </a:lvl2pPr>
+            <a:lvl3pPr marL="1143000" indent="-228600">
+              <a:defRPr>
+                <a:solidFill>
+                  <a:schemeClr val="tx1"/>
+                </a:solidFill>
+                <a:latin typeface="Calibri" panose="020F0502020204030204" pitchFamily="34" charset="0"/>
+              </a:defRPr>
+            </a:lvl3pPr>
+            <a:lvl4pPr marL="1600200" indent="-228600">
+              <a:defRPr>
+                <a:solidFill>
+                  <a:schemeClr val="tx1"/>
+                </a:solidFill>
+                <a:latin typeface="Calibri" panose="020F0502020204030204" pitchFamily="34" charset="0"/>
+              </a:defRPr>
+            </a:lvl4pPr>
+            <a:lvl5pPr marL="2057400" indent="-228600">
+              <a:defRPr>
+                <a:solidFill>
+                  <a:schemeClr val="tx1"/>
+                </a:solidFill>
+                <a:latin typeface="Calibri" panose="020F0502020204030204" pitchFamily="34" charset="0"/>
+              </a:defRPr>
+            </a:lvl5pPr>
+            <a:lvl6pPr marL="2514600" indent="-228600" eaLnBrk="0" fontAlgn="base" hangingPunct="0">
+              <a:spcBef>
+                <a:spcPct val="0"/>
+              </a:spcBef>
+              <a:spcAft>
+                <a:spcPct val="0"/>
+              </a:spcAft>
+              <a:defRPr>
+                <a:solidFill>
+                  <a:schemeClr val="tx1"/>
+                </a:solidFill>
+                <a:latin typeface="Calibri" panose="020F0502020204030204" pitchFamily="34" charset="0"/>
+              </a:defRPr>
+            </a:lvl6pPr>
+            <a:lvl7pPr marL="2971800" indent="-228600" eaLnBrk="0" fontAlgn="base" hangingPunct="0">
+              <a:spcBef>
+                <a:spcPct val="0"/>
+              </a:spcBef>
+              <a:spcAft>
+                <a:spcPct val="0"/>
+              </a:spcAft>
+              <a:defRPr>
+                <a:solidFill>
+                  <a:schemeClr val="tx1"/>
+                </a:solidFill>
+                <a:latin typeface="Calibri" panose="020F0502020204030204" pitchFamily="34" charset="0"/>
+              </a:defRPr>
+            </a:lvl7pPr>
+            <a:lvl8pPr marL="3429000" indent="-228600" eaLnBrk="0" fontAlgn="base" hangingPunct="0">
+              <a:spcBef>
+                <a:spcPct val="0"/>
+              </a:spcBef>
+              <a:spcAft>
+                <a:spcPct val="0"/>
+              </a:spcAft>
+              <a:defRPr>
+                <a:solidFill>
+                  <a:schemeClr val="tx1"/>
+                </a:solidFill>
+                <a:latin typeface="Calibri" panose="020F0502020204030204" pitchFamily="34" charset="0"/>
+              </a:defRPr>
+            </a:lvl8pPr>
+            <a:lvl9pPr marL="3886200" indent="-228600" eaLnBrk="0" fontAlgn="base" hangingPunct="0">
+              <a:spcBef>
+                <a:spcPct val="0"/>
+              </a:spcBef>
+              <a:spcAft>
+                <a:spcPct val="0"/>
+              </a:spcAft>
+              <a:defRPr>
+                <a:solidFill>
+                  <a:schemeClr val="tx1"/>
+                </a:solidFill>
+                <a:latin typeface="Calibri" panose="020F0502020204030204" pitchFamily="34" charset="0"/>
+              </a:defRPr>
+            </a:lvl9pPr>
+          </a:lstStyle>
+          <a:p>
+            <a:pPr algn="ctr" eaLnBrk="1" hangingPunct="1"/>
+            <a:r>
+              <a:rPr lang="en-US" altLang="en-US" sz="1200" dirty="0">
+                <a:latin typeface="Arial" panose="020B0604020202020204" pitchFamily="34" charset="0"/>
+                <a:ea typeface="Amazon Ember" panose="020B0603020204020204" pitchFamily="34" charset="0"/>
+                <a:cs typeface="Arial" panose="020B0604020202020204" pitchFamily="34" charset="0"/>
+              </a:rPr>
+              <a:t>AWS Key Management Service (AWS KMS)</a:t>
+            </a:r>
+          </a:p>
+        </p:txBody>
+      </p:sp>
+      <p:pic>
+        <p:nvPicPr>
+          <p:cNvPr id="56" name="Graphic 24">
+            <a:extLst>
+              <a:ext uri="{FF2B5EF4-FFF2-40B4-BE49-F238E27FC236}">
+                <a16:creationId xmlns:a16="http://schemas.microsoft.com/office/drawing/2014/main" id="{A7CCAF98-34A0-8F41-8F0B-7701CABDD2A1}"/>
+              </a:ext>
+            </a:extLst>
+          </p:cNvPr>
+          <p:cNvPicPr>
+            <a:picLocks noChangeAspect="1" noChangeArrowheads="1"/>
+          </p:cNvPicPr>
+          <p:nvPr/>
+        </p:nvPicPr>
+        <p:blipFill>
+          <a:blip r:embed="rId18">
+            <a:extLst>
+              <a:ext uri="{28A0092B-C50C-407E-A947-70E740481C1C}">
+                <a14:useLocalDpi xmlns:a14="http://schemas.microsoft.com/office/drawing/2010/main" val="0"/>
+              </a:ext>
+            </a:extLst>
+          </a:blip>
+          <a:srcRect/>
+          <a:stretch>
+            <a:fillRect/>
+          </a:stretch>
+        </p:blipFill>
+        <p:spPr bwMode="auto">
+          <a:xfrm>
+            <a:off x="10823229" y="160014"/>
+            <a:ext cx="762000" cy="762000"/>
+          </a:xfrm>
+          <a:prstGeom prst="rect">
+            <a:avLst/>
+          </a:prstGeom>
+          <a:noFill/>
+          <a:ln>
+            <a:noFill/>
+          </a:ln>
+          <a:extLst>
+            <a:ext uri="{909E8E84-426E-40DD-AFC4-6F175D3DCCD1}">
+              <a14:hiddenFill xmlns:a14="http://schemas.microsoft.com/office/drawing/2010/main">
+                <a:solidFill>
+                  <a:srgbClr val="FFFFFF"/>
+                </a:solidFill>
+              </a14:hiddenFill>
+            </a:ext>
+            <a:ext uri="{91240B29-F687-4F45-9708-019B960494DF}">
+              <a14:hiddenLine xmlns:a14="http://schemas.microsoft.com/office/drawing/2010/main" w="9525">
+                <a:solidFill>
+                  <a:srgbClr val="000000"/>
+                </a:solidFill>
+                <a:miter lim="800000"/>
+                <a:headEnd/>
+                <a:tailEnd/>
+              </a14:hiddenLine>
+            </a:ext>
+          </a:extLst>
+        </p:spPr>
+      </p:pic>
+      <p:sp>
+        <p:nvSpPr>
+          <p:cNvPr id="57" name="TextBox 9">
+            <a:extLst>
+              <a:ext uri="{FF2B5EF4-FFF2-40B4-BE49-F238E27FC236}">
+                <a16:creationId xmlns:a16="http://schemas.microsoft.com/office/drawing/2014/main" id="{9869CB1F-4DE7-EF43-8730-8559385D5B64}"/>
+              </a:ext>
+            </a:extLst>
+          </p:cNvPr>
+          <p:cNvSpPr txBox="1">
+            <a:spLocks noChangeArrowheads="1"/>
+          </p:cNvSpPr>
+          <p:nvPr/>
+        </p:nvSpPr>
+        <p:spPr bwMode="auto">
+          <a:xfrm>
+            <a:off x="10054879" y="923601"/>
+            <a:ext cx="2268537" cy="461665"/>
+          </a:xfrm>
+          <a:prstGeom prst="rect">
+            <a:avLst/>
+          </a:prstGeom>
+          <a:noFill/>
+          <a:ln>
+            <a:noFill/>
+          </a:ln>
+          <a:extLst>
+            <a:ext uri="{909E8E84-426E-40DD-AFC4-6F175D3DCCD1}">
+              <a14:hiddenFill xmlns:a14="http://schemas.microsoft.com/office/drawing/2010/main">
+                <a:solidFill>
+                  <a:srgbClr val="FFFFFF"/>
+                </a:solidFill>
+              </a14:hiddenFill>
+            </a:ext>
+            <a:ext uri="{91240B29-F687-4F45-9708-019B960494DF}">
+              <a14:hiddenLine xmlns:a14="http://schemas.microsoft.com/office/drawing/2010/main" w="9525">
+                <a:solidFill>
+                  <a:srgbClr val="000000"/>
+                </a:solidFill>
+                <a:miter lim="800000"/>
+                <a:headEnd/>
+                <a:tailEnd/>
+              </a14:hiddenLine>
+            </a:ext>
+          </a:extLst>
+        </p:spPr>
+        <p:txBody>
+          <a:bodyPr>
+            <a:spAutoFit/>
+          </a:bodyPr>
+          <a:lstStyle>
+            <a:lvl1pPr>
+              <a:defRPr>
+                <a:solidFill>
+                  <a:schemeClr val="tx1"/>
+                </a:solidFill>
+                <a:latin typeface="Calibri" panose="020F0502020204030204" pitchFamily="34" charset="0"/>
+              </a:defRPr>
+            </a:lvl1pPr>
+            <a:lvl2pPr marL="742950" indent="-285750">
+              <a:defRPr>
+                <a:solidFill>
+                  <a:schemeClr val="tx1"/>
+                </a:solidFill>
+                <a:latin typeface="Calibri" panose="020F0502020204030204" pitchFamily="34" charset="0"/>
+              </a:defRPr>
+            </a:lvl2pPr>
+            <a:lvl3pPr marL="1143000" indent="-228600">
+              <a:defRPr>
+                <a:solidFill>
+                  <a:schemeClr val="tx1"/>
+                </a:solidFill>
+                <a:latin typeface="Calibri" panose="020F0502020204030204" pitchFamily="34" charset="0"/>
+              </a:defRPr>
+            </a:lvl3pPr>
+            <a:lvl4pPr marL="1600200" indent="-228600">
+              <a:defRPr>
+                <a:solidFill>
+                  <a:schemeClr val="tx1"/>
+                </a:solidFill>
+                <a:latin typeface="Calibri" panose="020F0502020204030204" pitchFamily="34" charset="0"/>
+              </a:defRPr>
+            </a:lvl4pPr>
+            <a:lvl5pPr marL="2057400" indent="-228600">
+              <a:defRPr>
+                <a:solidFill>
+                  <a:schemeClr val="tx1"/>
+                </a:solidFill>
+                <a:latin typeface="Calibri" panose="020F0502020204030204" pitchFamily="34" charset="0"/>
+              </a:defRPr>
+            </a:lvl5pPr>
+            <a:lvl6pPr marL="2514600" indent="-228600" eaLnBrk="0" fontAlgn="base" hangingPunct="0">
+              <a:spcBef>
+                <a:spcPct val="0"/>
+              </a:spcBef>
+              <a:spcAft>
+                <a:spcPct val="0"/>
+              </a:spcAft>
+              <a:defRPr>
+                <a:solidFill>
+                  <a:schemeClr val="tx1"/>
+                </a:solidFill>
+                <a:latin typeface="Calibri" panose="020F0502020204030204" pitchFamily="34" charset="0"/>
+              </a:defRPr>
+            </a:lvl6pPr>
+            <a:lvl7pPr marL="2971800" indent="-228600" eaLnBrk="0" fontAlgn="base" hangingPunct="0">
+              <a:spcBef>
+                <a:spcPct val="0"/>
+              </a:spcBef>
+              <a:spcAft>
+                <a:spcPct val="0"/>
+              </a:spcAft>
+              <a:defRPr>
+                <a:solidFill>
+                  <a:schemeClr val="tx1"/>
+                </a:solidFill>
+                <a:latin typeface="Calibri" panose="020F0502020204030204" pitchFamily="34" charset="0"/>
+              </a:defRPr>
+            </a:lvl7pPr>
+            <a:lvl8pPr marL="3429000" indent="-228600" eaLnBrk="0" fontAlgn="base" hangingPunct="0">
+              <a:spcBef>
+                <a:spcPct val="0"/>
+              </a:spcBef>
+              <a:spcAft>
+                <a:spcPct val="0"/>
+              </a:spcAft>
+              <a:defRPr>
+                <a:solidFill>
+                  <a:schemeClr val="tx1"/>
+                </a:solidFill>
+                <a:latin typeface="Calibri" panose="020F0502020204030204" pitchFamily="34" charset="0"/>
+              </a:defRPr>
+            </a:lvl8pPr>
+            <a:lvl9pPr marL="3886200" indent="-228600" eaLnBrk="0" fontAlgn="base" hangingPunct="0">
+              <a:spcBef>
+                <a:spcPct val="0"/>
+              </a:spcBef>
+              <a:spcAft>
+                <a:spcPct val="0"/>
+              </a:spcAft>
+              <a:defRPr>
+                <a:solidFill>
+                  <a:schemeClr val="tx1"/>
+                </a:solidFill>
+                <a:latin typeface="Calibri" panose="020F0502020204030204" pitchFamily="34" charset="0"/>
+              </a:defRPr>
+            </a:lvl9pPr>
+          </a:lstStyle>
+          <a:p>
+            <a:pPr algn="ctr" eaLnBrk="1" hangingPunct="1"/>
+            <a:r>
+              <a:rPr lang="en-US" altLang="en-US" sz="1200" dirty="0">
+                <a:latin typeface="Arial" panose="020B0604020202020204" pitchFamily="34" charset="0"/>
+                <a:ea typeface="Amazon Ember" panose="020B0603020204020204" pitchFamily="34" charset="0"/>
+                <a:cs typeface="Arial" panose="020B0604020202020204" pitchFamily="34" charset="0"/>
+              </a:rPr>
+              <a:t>Amazon Simple Notification Service (Amazon SNS)</a:t>
+            </a:r>
+          </a:p>
+        </p:txBody>
+      </p:sp>
+      <p:cxnSp>
+        <p:nvCxnSpPr>
+          <p:cNvPr id="58" name="Straight Connector 57">
+            <a:extLst>
+              <a:ext uri="{FF2B5EF4-FFF2-40B4-BE49-F238E27FC236}">
+                <a16:creationId xmlns:a16="http://schemas.microsoft.com/office/drawing/2014/main" id="{A12D4ED1-C214-FD4E-B144-BF43D108737F}"/>
+              </a:ext>
+            </a:extLst>
+          </p:cNvPr>
+          <p:cNvCxnSpPr>
+            <a:cxnSpLocks/>
+            <a:stCxn id="35" idx="0"/>
+            <a:endCxn id="57" idx="2"/>
+          </p:cNvCxnSpPr>
+          <p:nvPr/>
+        </p:nvCxnSpPr>
+        <p:spPr>
+          <a:xfrm flipV="1">
+            <a:off x="11186692" y="1385266"/>
+            <a:ext cx="2456" cy="821117"/>
+          </a:xfrm>
+          <a:prstGeom prst="line">
+            <a:avLst/>
+          </a:prstGeom>
+          <a:ln w="12700">
+            <a:solidFill>
+              <a:schemeClr val="accent1"/>
+            </a:solidFill>
+            <a:headEnd type="none" w="med" len="sm"/>
+            <a:tailEnd type="none" w="med" len="sm"/>
+          </a:ln>
+        </p:spPr>
+        <p:style>
+          <a:lnRef idx="1">
+            <a:schemeClr val="accent1"/>
+          </a:lnRef>
+          <a:fillRef idx="0">
+            <a:schemeClr val="accent1"/>
+          </a:fillRef>
+          <a:effectRef idx="0">
+            <a:schemeClr val="accent1"/>
+          </a:effectRef>
+          <a:fontRef idx="minor">
+            <a:schemeClr val="tx1"/>
+          </a:fontRef>
+        </p:style>
+      </p:cxnSp>
+      <p:sp>
+        <p:nvSpPr>
+          <p:cNvPr id="59" name="TextBox 25">
+            <a:extLst>
+              <a:ext uri="{FF2B5EF4-FFF2-40B4-BE49-F238E27FC236}">
+                <a16:creationId xmlns:a16="http://schemas.microsoft.com/office/drawing/2014/main" id="{13D3AAF9-A3BD-6945-A7B2-B8F887EFCCC1}"/>
+              </a:ext>
+            </a:extLst>
+          </p:cNvPr>
+          <p:cNvSpPr txBox="1">
+            <a:spLocks noChangeArrowheads="1"/>
+          </p:cNvSpPr>
+          <p:nvPr/>
+        </p:nvSpPr>
+        <p:spPr bwMode="auto">
+          <a:xfrm>
+            <a:off x="10852323" y="1856554"/>
+            <a:ext cx="1385885" cy="261610"/>
+          </a:xfrm>
+          <a:prstGeom prst="rect">
+            <a:avLst/>
+          </a:prstGeom>
+          <a:noFill/>
+          <a:ln>
+            <a:noFill/>
+          </a:ln>
+          <a:extLst>
+            <a:ext uri="{909E8E84-426E-40DD-AFC4-6F175D3DCCD1}">
+              <a14:hiddenFill xmlns:a14="http://schemas.microsoft.com/office/drawing/2010/main">
+                <a:solidFill>
+                  <a:srgbClr val="FFFFFF"/>
+                </a:solidFill>
+              </a14:hiddenFill>
+            </a:ext>
+            <a:ext uri="{91240B29-F687-4F45-9708-019B960494DF}">
+              <a14:hiddenLine xmlns:a14="http://schemas.microsoft.com/office/drawing/2010/main" w="9525">
+                <a:solidFill>
+                  <a:srgbClr val="000000"/>
+                </a:solidFill>
+                <a:miter lim="800000"/>
+                <a:headEnd/>
+                <a:tailEnd/>
+              </a14:hiddenLine>
+            </a:ext>
+          </a:extLst>
+        </p:spPr>
+        <p:txBody>
+          <a:bodyPr wrap="square">
+            <a:spAutoFit/>
+          </a:bodyPr>
+          <a:lstStyle>
+            <a:lvl1pPr>
+              <a:defRPr>
+                <a:solidFill>
+                  <a:schemeClr val="tx1"/>
+                </a:solidFill>
+                <a:latin typeface="Calibri" panose="020F0502020204030204" pitchFamily="34" charset="0"/>
+              </a:defRPr>
+            </a:lvl1pPr>
+            <a:lvl2pPr marL="742950" indent="-285750">
+              <a:defRPr>
+                <a:solidFill>
+                  <a:schemeClr val="tx1"/>
+                </a:solidFill>
+                <a:latin typeface="Calibri" panose="020F0502020204030204" pitchFamily="34" charset="0"/>
+              </a:defRPr>
+            </a:lvl2pPr>
+            <a:lvl3pPr marL="1143000" indent="-228600">
+              <a:defRPr>
+                <a:solidFill>
+                  <a:schemeClr val="tx1"/>
+                </a:solidFill>
+                <a:latin typeface="Calibri" panose="020F0502020204030204" pitchFamily="34" charset="0"/>
+              </a:defRPr>
+            </a:lvl3pPr>
+            <a:lvl4pPr marL="1600200" indent="-228600">
+              <a:defRPr>
+                <a:solidFill>
+                  <a:schemeClr val="tx1"/>
+                </a:solidFill>
+                <a:latin typeface="Calibri" panose="020F0502020204030204" pitchFamily="34" charset="0"/>
+              </a:defRPr>
+            </a:lvl4pPr>
+            <a:lvl5pPr marL="2057400" indent="-228600">
+              <a:defRPr>
+                <a:solidFill>
+                  <a:schemeClr val="tx1"/>
+                </a:solidFill>
+                <a:latin typeface="Calibri" panose="020F0502020204030204" pitchFamily="34" charset="0"/>
+              </a:defRPr>
+            </a:lvl5pPr>
+            <a:lvl6pPr marL="2514600" indent="-228600" eaLnBrk="0" fontAlgn="base" hangingPunct="0">
+              <a:spcBef>
+                <a:spcPct val="0"/>
+              </a:spcBef>
+              <a:spcAft>
+                <a:spcPct val="0"/>
+              </a:spcAft>
+              <a:defRPr>
+                <a:solidFill>
+                  <a:schemeClr val="tx1"/>
+                </a:solidFill>
+                <a:latin typeface="Calibri" panose="020F0502020204030204" pitchFamily="34" charset="0"/>
+              </a:defRPr>
+            </a:lvl6pPr>
+            <a:lvl7pPr marL="2971800" indent="-228600" eaLnBrk="0" fontAlgn="base" hangingPunct="0">
+              <a:spcBef>
+                <a:spcPct val="0"/>
+              </a:spcBef>
+              <a:spcAft>
+                <a:spcPct val="0"/>
+              </a:spcAft>
+              <a:defRPr>
+                <a:solidFill>
+                  <a:schemeClr val="tx1"/>
+                </a:solidFill>
+                <a:latin typeface="Calibri" panose="020F0502020204030204" pitchFamily="34" charset="0"/>
+              </a:defRPr>
+            </a:lvl7pPr>
+            <a:lvl8pPr marL="3429000" indent="-228600" eaLnBrk="0" fontAlgn="base" hangingPunct="0">
+              <a:spcBef>
+                <a:spcPct val="0"/>
+              </a:spcBef>
+              <a:spcAft>
+                <a:spcPct val="0"/>
+              </a:spcAft>
+              <a:defRPr>
+                <a:solidFill>
+                  <a:schemeClr val="tx1"/>
+                </a:solidFill>
+                <a:latin typeface="Calibri" panose="020F0502020204030204" pitchFamily="34" charset="0"/>
+              </a:defRPr>
+            </a:lvl8pPr>
+            <a:lvl9pPr marL="3886200" indent="-228600" eaLnBrk="0" fontAlgn="base" hangingPunct="0">
+              <a:spcBef>
+                <a:spcPct val="0"/>
+              </a:spcBef>
+              <a:spcAft>
+                <a:spcPct val="0"/>
+              </a:spcAft>
+              <a:defRPr>
+                <a:solidFill>
+                  <a:schemeClr val="tx1"/>
+                </a:solidFill>
+                <a:latin typeface="Calibri" panose="020F0502020204030204" pitchFamily="34" charset="0"/>
+              </a:defRPr>
+            </a:lvl9pPr>
+          </a:lstStyle>
+          <a:p>
+            <a:pPr algn="ctr" eaLnBrk="1" hangingPunct="1"/>
+            <a:r>
+              <a:rPr lang="en-US" altLang="en-US" sz="1100" dirty="0">
+                <a:latin typeface="Arial" panose="020B0604020202020204" pitchFamily="34" charset="0"/>
+                <a:ea typeface="Amazon Ember" panose="020B0603020204020204" pitchFamily="34" charset="0"/>
+                <a:cs typeface="Arial" panose="020B0604020202020204" pitchFamily="34" charset="0"/>
+              </a:rPr>
+              <a:t>Topic</a:t>
+            </a:r>
+          </a:p>
+        </p:txBody>
+      </p:sp>
+      <p:pic>
+        <p:nvPicPr>
+          <p:cNvPr id="60" name="Graphic 17">
+            <a:extLst>
+              <a:ext uri="{FF2B5EF4-FFF2-40B4-BE49-F238E27FC236}">
+                <a16:creationId xmlns:a16="http://schemas.microsoft.com/office/drawing/2014/main" id="{35531979-8C1E-D04D-8319-E49D97CAC131}"/>
+              </a:ext>
+            </a:extLst>
+          </p:cNvPr>
+          <p:cNvPicPr>
+            <a:picLocks noChangeAspect="1" noChangeArrowheads="1"/>
+          </p:cNvPicPr>
+          <p:nvPr/>
+        </p:nvPicPr>
+        <p:blipFill>
+          <a:blip r:embed="rId19">
+            <a:extLst>
+              <a:ext uri="{28A0092B-C50C-407E-A947-70E740481C1C}">
+                <a14:useLocalDpi xmlns:a14="http://schemas.microsoft.com/office/drawing/2010/main" val="0"/>
+              </a:ext>
+            </a:extLst>
+          </a:blip>
+          <a:srcRect/>
+          <a:stretch>
+            <a:fillRect/>
+          </a:stretch>
+        </p:blipFill>
+        <p:spPr bwMode="auto">
+          <a:xfrm>
+            <a:off x="11314352" y="1383479"/>
+            <a:ext cx="457200" cy="457200"/>
+          </a:xfrm>
+          <a:prstGeom prst="rect">
+            <a:avLst/>
+          </a:prstGeom>
+          <a:noFill/>
+          <a:ln>
+            <a:noFill/>
+          </a:ln>
+          <a:extLst>
+            <a:ext uri="{909E8E84-426E-40DD-AFC4-6F175D3DCCD1}">
+              <a14:hiddenFill xmlns:a14="http://schemas.microsoft.com/office/drawing/2010/main">
+                <a:solidFill>
+                  <a:srgbClr val="FFFFFF"/>
+                </a:solidFill>
+              </a14:hiddenFill>
+            </a:ext>
+            <a:ext uri="{91240B29-F687-4F45-9708-019B960494DF}">
+              <a14:hiddenLine xmlns:a14="http://schemas.microsoft.com/office/drawing/2010/main" w="9525">
+                <a:solidFill>
+                  <a:srgbClr val="000000"/>
+                </a:solidFill>
+                <a:miter lim="800000"/>
+                <a:headEnd/>
+                <a:tailEnd/>
+              </a14:hiddenLine>
+            </a:ext>
+          </a:extLst>
+        </p:spPr>
+      </p:pic>
+      <p:sp>
+        <p:nvSpPr>
+          <p:cNvPr id="63" name="TextBox 25">
+            <a:extLst>
+              <a:ext uri="{FF2B5EF4-FFF2-40B4-BE49-F238E27FC236}">
+                <a16:creationId xmlns:a16="http://schemas.microsoft.com/office/drawing/2014/main" id="{C31DD74C-DD84-5349-AB36-28CECF61D8C3}"/>
+              </a:ext>
+            </a:extLst>
+          </p:cNvPr>
+          <p:cNvSpPr txBox="1">
+            <a:spLocks noChangeArrowheads="1"/>
+          </p:cNvSpPr>
+          <p:nvPr/>
+        </p:nvSpPr>
+        <p:spPr bwMode="auto">
+          <a:xfrm>
+            <a:off x="10794875" y="3776994"/>
+            <a:ext cx="1385885" cy="261610"/>
+          </a:xfrm>
+          <a:prstGeom prst="rect">
+            <a:avLst/>
+          </a:prstGeom>
+          <a:noFill/>
+          <a:ln>
+            <a:noFill/>
+          </a:ln>
+          <a:extLst>
+            <a:ext uri="{909E8E84-426E-40DD-AFC4-6F175D3DCCD1}">
+              <a14:hiddenFill xmlns:a14="http://schemas.microsoft.com/office/drawing/2010/main">
+                <a:solidFill>
+                  <a:srgbClr val="FFFFFF"/>
+                </a:solidFill>
+              </a14:hiddenFill>
+            </a:ext>
+            <a:ext uri="{91240B29-F687-4F45-9708-019B960494DF}">
+              <a14:hiddenLine xmlns:a14="http://schemas.microsoft.com/office/drawing/2010/main" w="9525">
+                <a:solidFill>
+                  <a:srgbClr val="000000"/>
+                </a:solidFill>
+                <a:miter lim="800000"/>
+                <a:headEnd/>
+                <a:tailEnd/>
+              </a14:hiddenLine>
+            </a:ext>
+          </a:extLst>
+        </p:spPr>
+        <p:txBody>
+          <a:bodyPr wrap="square">
+            <a:spAutoFit/>
+          </a:bodyPr>
+          <a:lstStyle>
+            <a:lvl1pPr>
+              <a:defRPr>
+                <a:solidFill>
+                  <a:schemeClr val="tx1"/>
+                </a:solidFill>
+                <a:latin typeface="Calibri" panose="020F0502020204030204" pitchFamily="34" charset="0"/>
+              </a:defRPr>
+            </a:lvl1pPr>
+            <a:lvl2pPr marL="742950" indent="-285750">
+              <a:defRPr>
+                <a:solidFill>
+                  <a:schemeClr val="tx1"/>
+                </a:solidFill>
+                <a:latin typeface="Calibri" panose="020F0502020204030204" pitchFamily="34" charset="0"/>
+              </a:defRPr>
+            </a:lvl2pPr>
+            <a:lvl3pPr marL="1143000" indent="-228600">
+              <a:defRPr>
+                <a:solidFill>
+                  <a:schemeClr val="tx1"/>
+                </a:solidFill>
+                <a:latin typeface="Calibri" panose="020F0502020204030204" pitchFamily="34" charset="0"/>
+              </a:defRPr>
+            </a:lvl3pPr>
+            <a:lvl4pPr marL="1600200" indent="-228600">
+              <a:defRPr>
+                <a:solidFill>
+                  <a:schemeClr val="tx1"/>
+                </a:solidFill>
+                <a:latin typeface="Calibri" panose="020F0502020204030204" pitchFamily="34" charset="0"/>
+              </a:defRPr>
+            </a:lvl4pPr>
+            <a:lvl5pPr marL="2057400" indent="-228600">
+              <a:defRPr>
+                <a:solidFill>
+                  <a:schemeClr val="tx1"/>
+                </a:solidFill>
+                <a:latin typeface="Calibri" panose="020F0502020204030204" pitchFamily="34" charset="0"/>
+              </a:defRPr>
+            </a:lvl5pPr>
+            <a:lvl6pPr marL="2514600" indent="-228600" eaLnBrk="0" fontAlgn="base" hangingPunct="0">
+              <a:spcBef>
+                <a:spcPct val="0"/>
+              </a:spcBef>
+              <a:spcAft>
+                <a:spcPct val="0"/>
+              </a:spcAft>
+              <a:defRPr>
+                <a:solidFill>
+                  <a:schemeClr val="tx1"/>
+                </a:solidFill>
+                <a:latin typeface="Calibri" panose="020F0502020204030204" pitchFamily="34" charset="0"/>
+              </a:defRPr>
+            </a:lvl6pPr>
+            <a:lvl7pPr marL="2971800" indent="-228600" eaLnBrk="0" fontAlgn="base" hangingPunct="0">
+              <a:spcBef>
+                <a:spcPct val="0"/>
+              </a:spcBef>
+              <a:spcAft>
+                <a:spcPct val="0"/>
+              </a:spcAft>
+              <a:defRPr>
+                <a:solidFill>
+                  <a:schemeClr val="tx1"/>
+                </a:solidFill>
+                <a:latin typeface="Calibri" panose="020F0502020204030204" pitchFamily="34" charset="0"/>
+              </a:defRPr>
+            </a:lvl7pPr>
+            <a:lvl8pPr marL="3429000" indent="-228600" eaLnBrk="0" fontAlgn="base" hangingPunct="0">
+              <a:spcBef>
+                <a:spcPct val="0"/>
+              </a:spcBef>
+              <a:spcAft>
+                <a:spcPct val="0"/>
+              </a:spcAft>
+              <a:defRPr>
+                <a:solidFill>
+                  <a:schemeClr val="tx1"/>
+                </a:solidFill>
+                <a:latin typeface="Calibri" panose="020F0502020204030204" pitchFamily="34" charset="0"/>
+              </a:defRPr>
+            </a:lvl8pPr>
+            <a:lvl9pPr marL="3886200" indent="-228600" eaLnBrk="0" fontAlgn="base" hangingPunct="0">
+              <a:spcBef>
+                <a:spcPct val="0"/>
+              </a:spcBef>
+              <a:spcAft>
+                <a:spcPct val="0"/>
+              </a:spcAft>
+              <a:defRPr>
+                <a:solidFill>
+                  <a:schemeClr val="tx1"/>
+                </a:solidFill>
+                <a:latin typeface="Calibri" panose="020F0502020204030204" pitchFamily="34" charset="0"/>
+              </a:defRPr>
+            </a:lvl9pPr>
+          </a:lstStyle>
+          <a:p>
+            <a:pPr algn="ctr" eaLnBrk="1" hangingPunct="1"/>
+            <a:r>
+              <a:rPr lang="en-US" altLang="en-US" sz="1100" dirty="0">
+                <a:latin typeface="Arial" panose="020B0604020202020204" pitchFamily="34" charset="0"/>
+                <a:ea typeface="Amazon Ember" panose="020B0603020204020204" pitchFamily="34" charset="0"/>
+                <a:cs typeface="Arial" panose="020B0604020202020204" pitchFamily="34" charset="0"/>
+              </a:rPr>
+              <a:t>Alarm</a:t>
+            </a:r>
+          </a:p>
+        </p:txBody>
+      </p:sp>
     </p:spTree>
     <p:extLst>
       <p:ext uri="{BB962C8B-B14F-4D97-AF65-F5344CB8AC3E}">

</xml_diff>

<commit_message>
Updated architecture diagram & section per feedback
</commit_message>
<xml_diff>
--- a/docs/deployment_guide/images/architecture_diagram.pptx
+++ b/docs/deployment_guide/images/architecture_diagram.pptx
@@ -259,7 +259,7 @@
           <a:p>
             <a:fld id="{910FE9F8-85C6-4D94-8C60-6B46B301E45E}" type="datetimeFigureOut">
               <a:rPr lang="en-US" smtClean="0"/>
-              <a:t>2022-04-29</a:t>
+              <a:t>2022-09-07</a:t>
             </a:fld>
             <a:endParaRPr lang="en-US"/>
           </a:p>
@@ -457,7 +457,7 @@
           <a:p>
             <a:fld id="{910FE9F8-85C6-4D94-8C60-6B46B301E45E}" type="datetimeFigureOut">
               <a:rPr lang="en-US" smtClean="0"/>
-              <a:t>2022-04-29</a:t>
+              <a:t>2022-09-07</a:t>
             </a:fld>
             <a:endParaRPr lang="en-US"/>
           </a:p>
@@ -665,7 +665,7 @@
           <a:p>
             <a:fld id="{910FE9F8-85C6-4D94-8C60-6B46B301E45E}" type="datetimeFigureOut">
               <a:rPr lang="en-US" smtClean="0"/>
-              <a:t>2022-04-29</a:t>
+              <a:t>2022-09-07</a:t>
             </a:fld>
             <a:endParaRPr lang="en-US"/>
           </a:p>
@@ -863,7 +863,7 @@
           <a:p>
             <a:fld id="{910FE9F8-85C6-4D94-8C60-6B46B301E45E}" type="datetimeFigureOut">
               <a:rPr lang="en-US" smtClean="0"/>
-              <a:t>2022-04-29</a:t>
+              <a:t>2022-09-07</a:t>
             </a:fld>
             <a:endParaRPr lang="en-US"/>
           </a:p>
@@ -1138,7 +1138,7 @@
           <a:p>
             <a:fld id="{910FE9F8-85C6-4D94-8C60-6B46B301E45E}" type="datetimeFigureOut">
               <a:rPr lang="en-US" smtClean="0"/>
-              <a:t>2022-04-29</a:t>
+              <a:t>2022-09-07</a:t>
             </a:fld>
             <a:endParaRPr lang="en-US"/>
           </a:p>
@@ -1403,7 +1403,7 @@
           <a:p>
             <a:fld id="{910FE9F8-85C6-4D94-8C60-6B46B301E45E}" type="datetimeFigureOut">
               <a:rPr lang="en-US" smtClean="0"/>
-              <a:t>2022-04-29</a:t>
+              <a:t>2022-09-07</a:t>
             </a:fld>
             <a:endParaRPr lang="en-US"/>
           </a:p>
@@ -1815,7 +1815,7 @@
           <a:p>
             <a:fld id="{910FE9F8-85C6-4D94-8C60-6B46B301E45E}" type="datetimeFigureOut">
               <a:rPr lang="en-US" smtClean="0"/>
-              <a:t>2022-04-29</a:t>
+              <a:t>2022-09-07</a:t>
             </a:fld>
             <a:endParaRPr lang="en-US"/>
           </a:p>
@@ -1956,7 +1956,7 @@
           <a:p>
             <a:fld id="{910FE9F8-85C6-4D94-8C60-6B46B301E45E}" type="datetimeFigureOut">
               <a:rPr lang="en-US" smtClean="0"/>
-              <a:t>2022-04-29</a:t>
+              <a:t>2022-09-07</a:t>
             </a:fld>
             <a:endParaRPr lang="en-US"/>
           </a:p>
@@ -2069,7 +2069,7 @@
           <a:p>
             <a:fld id="{910FE9F8-85C6-4D94-8C60-6B46B301E45E}" type="datetimeFigureOut">
               <a:rPr lang="en-US" smtClean="0"/>
-              <a:t>2022-04-29</a:t>
+              <a:t>2022-09-07</a:t>
             </a:fld>
             <a:endParaRPr lang="en-US"/>
           </a:p>
@@ -2380,7 +2380,7 @@
           <a:p>
             <a:fld id="{910FE9F8-85C6-4D94-8C60-6B46B301E45E}" type="datetimeFigureOut">
               <a:rPr lang="en-US" smtClean="0"/>
-              <a:t>2022-04-29</a:t>
+              <a:t>2022-09-07</a:t>
             </a:fld>
             <a:endParaRPr lang="en-US"/>
           </a:p>
@@ -2668,7 +2668,7 @@
           <a:p>
             <a:fld id="{910FE9F8-85C6-4D94-8C60-6B46B301E45E}" type="datetimeFigureOut">
               <a:rPr lang="en-US" smtClean="0"/>
-              <a:t>2022-04-29</a:t>
+              <a:t>2022-09-07</a:t>
             </a:fld>
             <a:endParaRPr lang="en-US"/>
           </a:p>
@@ -2909,7 +2909,7 @@
           <a:p>
             <a:fld id="{910FE9F8-85C6-4D94-8C60-6B46B301E45E}" type="datetimeFigureOut">
               <a:rPr lang="en-US" smtClean="0"/>
-              <a:t>2022-04-29</a:t>
+              <a:t>2022-09-07</a:t>
             </a:fld>
             <a:endParaRPr lang="en-US"/>
           </a:p>
@@ -4881,8 +4881,8 @@
         </p:nvSpPr>
         <p:spPr>
           <a:xfrm>
-            <a:off x="7381857" y="3166352"/>
-            <a:ext cx="4260100" cy="1715051"/>
+            <a:off x="7381857" y="2219497"/>
+            <a:ext cx="4260100" cy="2661906"/>
           </a:xfrm>
           <a:prstGeom prst="rect">
             <a:avLst/>
@@ -6993,6 +6993,495 @@
           </a:p>
         </p:txBody>
       </p:sp>
+      <p:pic>
+        <p:nvPicPr>
+          <p:cNvPr id="45" name="Graphic 17">
+            <a:extLst>
+              <a:ext uri="{FF2B5EF4-FFF2-40B4-BE49-F238E27FC236}">
+                <a16:creationId xmlns:a16="http://schemas.microsoft.com/office/drawing/2014/main" id="{716B9FE1-6918-47C9-9CD7-8A696B1BBFBC}"/>
+              </a:ext>
+            </a:extLst>
+          </p:cNvPr>
+          <p:cNvPicPr>
+            <a:picLocks noChangeAspect="1" noChangeArrowheads="1"/>
+          </p:cNvPicPr>
+          <p:nvPr/>
+        </p:nvPicPr>
+        <p:blipFill>
+          <a:blip r:embed="rId24">
+            <a:extLst>
+              <a:ext uri="{28A0092B-C50C-407E-A947-70E740481C1C}">
+                <a14:useLocalDpi xmlns:a14="http://schemas.microsoft.com/office/drawing/2010/main" val="0"/>
+              </a:ext>
+            </a:extLst>
+          </a:blip>
+          <a:srcRect/>
+          <a:stretch>
+            <a:fillRect/>
+          </a:stretch>
+        </p:blipFill>
+        <p:spPr bwMode="auto">
+          <a:xfrm>
+            <a:off x="7652655" y="827764"/>
+            <a:ext cx="762000" cy="762000"/>
+          </a:xfrm>
+          <a:prstGeom prst="rect">
+            <a:avLst/>
+          </a:prstGeom>
+          <a:noFill/>
+          <a:ln>
+            <a:noFill/>
+          </a:ln>
+          <a:extLst>
+            <a:ext uri="{909E8E84-426E-40DD-AFC4-6F175D3DCCD1}">
+              <a14:hiddenFill xmlns:a14="http://schemas.microsoft.com/office/drawing/2010/main">
+                <a:solidFill>
+                  <a:srgbClr val="FFFFFF"/>
+                </a:solidFill>
+              </a14:hiddenFill>
+            </a:ext>
+            <a:ext uri="{91240B29-F687-4F45-9708-019B960494DF}">
+              <a14:hiddenLine xmlns:a14="http://schemas.microsoft.com/office/drawing/2010/main" w="9525">
+                <a:solidFill>
+                  <a:srgbClr val="000000"/>
+                </a:solidFill>
+                <a:miter lim="800000"/>
+                <a:headEnd/>
+                <a:tailEnd/>
+              </a14:hiddenLine>
+            </a:ext>
+          </a:extLst>
+        </p:spPr>
+      </p:pic>
+      <p:sp>
+        <p:nvSpPr>
+          <p:cNvPr id="46" name="TextBox 11">
+            <a:extLst>
+              <a:ext uri="{FF2B5EF4-FFF2-40B4-BE49-F238E27FC236}">
+                <a16:creationId xmlns:a16="http://schemas.microsoft.com/office/drawing/2014/main" id="{0C9B7F59-4DB3-41A8-BEBB-DEC5B3D05EA2}"/>
+              </a:ext>
+            </a:extLst>
+          </p:cNvPr>
+          <p:cNvSpPr txBox="1">
+            <a:spLocks noChangeArrowheads="1"/>
+          </p:cNvSpPr>
+          <p:nvPr/>
+        </p:nvSpPr>
+        <p:spPr bwMode="auto">
+          <a:xfrm>
+            <a:off x="7151078" y="1590606"/>
+            <a:ext cx="1765153" cy="276999"/>
+          </a:xfrm>
+          <a:prstGeom prst="rect">
+            <a:avLst/>
+          </a:prstGeom>
+          <a:noFill/>
+          <a:ln>
+            <a:noFill/>
+          </a:ln>
+          <a:extLst>
+            <a:ext uri="{909E8E84-426E-40DD-AFC4-6F175D3DCCD1}">
+              <a14:hiddenFill xmlns:a14="http://schemas.microsoft.com/office/drawing/2010/main">
+                <a:solidFill>
+                  <a:srgbClr val="FFFFFF"/>
+                </a:solidFill>
+              </a14:hiddenFill>
+            </a:ext>
+            <a:ext uri="{91240B29-F687-4F45-9708-019B960494DF}">
+              <a14:hiddenLine xmlns:a14="http://schemas.microsoft.com/office/drawing/2010/main" w="9525">
+                <a:solidFill>
+                  <a:srgbClr val="000000"/>
+                </a:solidFill>
+                <a:miter lim="800000"/>
+                <a:headEnd/>
+                <a:tailEnd/>
+              </a14:hiddenLine>
+            </a:ext>
+          </a:extLst>
+        </p:spPr>
+        <p:txBody>
+          <a:bodyPr wrap="square">
+            <a:spAutoFit/>
+          </a:bodyPr>
+          <a:lstStyle>
+            <a:lvl1pPr>
+              <a:defRPr>
+                <a:solidFill>
+                  <a:schemeClr val="tx1"/>
+                </a:solidFill>
+                <a:latin typeface="Calibri" panose="020F0502020204030204" pitchFamily="34" charset="0"/>
+              </a:defRPr>
+            </a:lvl1pPr>
+            <a:lvl2pPr marL="742950" indent="-285750">
+              <a:defRPr>
+                <a:solidFill>
+                  <a:schemeClr val="tx1"/>
+                </a:solidFill>
+                <a:latin typeface="Calibri" panose="020F0502020204030204" pitchFamily="34" charset="0"/>
+              </a:defRPr>
+            </a:lvl2pPr>
+            <a:lvl3pPr marL="1143000" indent="-228600">
+              <a:defRPr>
+                <a:solidFill>
+                  <a:schemeClr val="tx1"/>
+                </a:solidFill>
+                <a:latin typeface="Calibri" panose="020F0502020204030204" pitchFamily="34" charset="0"/>
+              </a:defRPr>
+            </a:lvl3pPr>
+            <a:lvl4pPr marL="1600200" indent="-228600">
+              <a:defRPr>
+                <a:solidFill>
+                  <a:schemeClr val="tx1"/>
+                </a:solidFill>
+                <a:latin typeface="Calibri" panose="020F0502020204030204" pitchFamily="34" charset="0"/>
+              </a:defRPr>
+            </a:lvl4pPr>
+            <a:lvl5pPr marL="2057400" indent="-228600">
+              <a:defRPr>
+                <a:solidFill>
+                  <a:schemeClr val="tx1"/>
+                </a:solidFill>
+                <a:latin typeface="Calibri" panose="020F0502020204030204" pitchFamily="34" charset="0"/>
+              </a:defRPr>
+            </a:lvl5pPr>
+            <a:lvl6pPr marL="2514600" indent="-228600" eaLnBrk="0" fontAlgn="base" hangingPunct="0">
+              <a:spcBef>
+                <a:spcPct val="0"/>
+              </a:spcBef>
+              <a:spcAft>
+                <a:spcPct val="0"/>
+              </a:spcAft>
+              <a:defRPr>
+                <a:solidFill>
+                  <a:schemeClr val="tx1"/>
+                </a:solidFill>
+                <a:latin typeface="Calibri" panose="020F0502020204030204" pitchFamily="34" charset="0"/>
+              </a:defRPr>
+            </a:lvl6pPr>
+            <a:lvl7pPr marL="2971800" indent="-228600" eaLnBrk="0" fontAlgn="base" hangingPunct="0">
+              <a:spcBef>
+                <a:spcPct val="0"/>
+              </a:spcBef>
+              <a:spcAft>
+                <a:spcPct val="0"/>
+              </a:spcAft>
+              <a:defRPr>
+                <a:solidFill>
+                  <a:schemeClr val="tx1"/>
+                </a:solidFill>
+                <a:latin typeface="Calibri" panose="020F0502020204030204" pitchFamily="34" charset="0"/>
+              </a:defRPr>
+            </a:lvl7pPr>
+            <a:lvl8pPr marL="3429000" indent="-228600" eaLnBrk="0" fontAlgn="base" hangingPunct="0">
+              <a:spcBef>
+                <a:spcPct val="0"/>
+              </a:spcBef>
+              <a:spcAft>
+                <a:spcPct val="0"/>
+              </a:spcAft>
+              <a:defRPr>
+                <a:solidFill>
+                  <a:schemeClr val="tx1"/>
+                </a:solidFill>
+                <a:latin typeface="Calibri" panose="020F0502020204030204" pitchFamily="34" charset="0"/>
+              </a:defRPr>
+            </a:lvl8pPr>
+            <a:lvl9pPr marL="3886200" indent="-228600" eaLnBrk="0" fontAlgn="base" hangingPunct="0">
+              <a:spcBef>
+                <a:spcPct val="0"/>
+              </a:spcBef>
+              <a:spcAft>
+                <a:spcPct val="0"/>
+              </a:spcAft>
+              <a:defRPr>
+                <a:solidFill>
+                  <a:schemeClr val="tx1"/>
+                </a:solidFill>
+                <a:latin typeface="Calibri" panose="020F0502020204030204" pitchFamily="34" charset="0"/>
+              </a:defRPr>
+            </a:lvl9pPr>
+          </a:lstStyle>
+          <a:p>
+            <a:pPr algn="ctr" eaLnBrk="1" hangingPunct="1"/>
+            <a:r>
+              <a:rPr lang="en-US" altLang="en-US" sz="1200" dirty="0">
+                <a:latin typeface="Arial" panose="020B0604020202020204" pitchFamily="34" charset="0"/>
+                <a:ea typeface="Amazon Ember" panose="020B0603020204020204" pitchFamily="34" charset="0"/>
+                <a:cs typeface="Arial" panose="020B0604020202020204" pitchFamily="34" charset="0"/>
+              </a:rPr>
+              <a:t>AWS Secrets Manager</a:t>
+            </a:r>
+          </a:p>
+        </p:txBody>
+      </p:sp>
+      <p:pic>
+        <p:nvPicPr>
+          <p:cNvPr id="47" name="Graphic 7">
+            <a:extLst>
+              <a:ext uri="{FF2B5EF4-FFF2-40B4-BE49-F238E27FC236}">
+                <a16:creationId xmlns:a16="http://schemas.microsoft.com/office/drawing/2014/main" id="{EB793E59-5DA7-4BB5-AE05-EB52F938D922}"/>
+              </a:ext>
+            </a:extLst>
+          </p:cNvPr>
+          <p:cNvPicPr>
+            <a:picLocks noChangeAspect="1" noChangeArrowheads="1"/>
+          </p:cNvPicPr>
+          <p:nvPr/>
+        </p:nvPicPr>
+        <p:blipFill>
+          <a:blip r:embed="rId25">
+            <a:extLst>
+              <a:ext uri="{28A0092B-C50C-407E-A947-70E740481C1C}">
+                <a14:useLocalDpi xmlns:a14="http://schemas.microsoft.com/office/drawing/2010/main" val="0"/>
+              </a:ext>
+            </a:extLst>
+          </a:blip>
+          <a:srcRect/>
+          <a:stretch>
+            <a:fillRect/>
+          </a:stretch>
+        </p:blipFill>
+        <p:spPr bwMode="auto">
+          <a:xfrm>
+            <a:off x="7645172" y="2322681"/>
+            <a:ext cx="762000" cy="762000"/>
+          </a:xfrm>
+          <a:prstGeom prst="rect">
+            <a:avLst/>
+          </a:prstGeom>
+          <a:noFill/>
+          <a:ln>
+            <a:noFill/>
+          </a:ln>
+          <a:extLst>
+            <a:ext uri="{909E8E84-426E-40DD-AFC4-6F175D3DCCD1}">
+              <a14:hiddenFill xmlns:a14="http://schemas.microsoft.com/office/drawing/2010/main">
+                <a:solidFill>
+                  <a:srgbClr val="FFFFFF"/>
+                </a:solidFill>
+              </a14:hiddenFill>
+            </a:ext>
+            <a:ext uri="{91240B29-F687-4F45-9708-019B960494DF}">
+              <a14:hiddenLine xmlns:a14="http://schemas.microsoft.com/office/drawing/2010/main" w="9525">
+                <a:solidFill>
+                  <a:srgbClr val="000000"/>
+                </a:solidFill>
+                <a:miter lim="800000"/>
+                <a:headEnd/>
+                <a:tailEnd/>
+              </a14:hiddenLine>
+            </a:ext>
+          </a:extLst>
+        </p:spPr>
+      </p:pic>
+      <p:sp>
+        <p:nvSpPr>
+          <p:cNvPr id="48" name="TextBox 9">
+            <a:extLst>
+              <a:ext uri="{FF2B5EF4-FFF2-40B4-BE49-F238E27FC236}">
+                <a16:creationId xmlns:a16="http://schemas.microsoft.com/office/drawing/2014/main" id="{DEB301E0-E747-44A4-B70F-C63F0BEA5596}"/>
+              </a:ext>
+            </a:extLst>
+          </p:cNvPr>
+          <p:cNvSpPr txBox="1">
+            <a:spLocks noChangeArrowheads="1"/>
+          </p:cNvSpPr>
+          <p:nvPr/>
+        </p:nvSpPr>
+        <p:spPr bwMode="auto">
+          <a:xfrm>
+            <a:off x="7504693" y="3090652"/>
+            <a:ext cx="1042957" cy="276999"/>
+          </a:xfrm>
+          <a:prstGeom prst="rect">
+            <a:avLst/>
+          </a:prstGeom>
+          <a:noFill/>
+          <a:ln>
+            <a:noFill/>
+          </a:ln>
+          <a:extLst>
+            <a:ext uri="{909E8E84-426E-40DD-AFC4-6F175D3DCCD1}">
+              <a14:hiddenFill xmlns:a14="http://schemas.microsoft.com/office/drawing/2010/main">
+                <a:solidFill>
+                  <a:srgbClr val="FFFFFF"/>
+                </a:solidFill>
+              </a14:hiddenFill>
+            </a:ext>
+            <a:ext uri="{91240B29-F687-4F45-9708-019B960494DF}">
+              <a14:hiddenLine xmlns:a14="http://schemas.microsoft.com/office/drawing/2010/main" w="9525">
+                <a:solidFill>
+                  <a:srgbClr val="000000"/>
+                </a:solidFill>
+                <a:miter lim="800000"/>
+                <a:headEnd/>
+                <a:tailEnd/>
+              </a14:hiddenLine>
+            </a:ext>
+          </a:extLst>
+        </p:spPr>
+        <p:txBody>
+          <a:bodyPr wrap="square">
+            <a:spAutoFit/>
+          </a:bodyPr>
+          <a:lstStyle>
+            <a:lvl1pPr>
+              <a:defRPr>
+                <a:solidFill>
+                  <a:schemeClr val="tx1"/>
+                </a:solidFill>
+                <a:latin typeface="Calibri" panose="020F0502020204030204" pitchFamily="34" charset="0"/>
+              </a:defRPr>
+            </a:lvl1pPr>
+            <a:lvl2pPr marL="742950" indent="-285750">
+              <a:defRPr>
+                <a:solidFill>
+                  <a:schemeClr val="tx1"/>
+                </a:solidFill>
+                <a:latin typeface="Calibri" panose="020F0502020204030204" pitchFamily="34" charset="0"/>
+              </a:defRPr>
+            </a:lvl2pPr>
+            <a:lvl3pPr marL="1143000" indent="-228600">
+              <a:defRPr>
+                <a:solidFill>
+                  <a:schemeClr val="tx1"/>
+                </a:solidFill>
+                <a:latin typeface="Calibri" panose="020F0502020204030204" pitchFamily="34" charset="0"/>
+              </a:defRPr>
+            </a:lvl3pPr>
+            <a:lvl4pPr marL="1600200" indent="-228600">
+              <a:defRPr>
+                <a:solidFill>
+                  <a:schemeClr val="tx1"/>
+                </a:solidFill>
+                <a:latin typeface="Calibri" panose="020F0502020204030204" pitchFamily="34" charset="0"/>
+              </a:defRPr>
+            </a:lvl4pPr>
+            <a:lvl5pPr marL="2057400" indent="-228600">
+              <a:defRPr>
+                <a:solidFill>
+                  <a:schemeClr val="tx1"/>
+                </a:solidFill>
+                <a:latin typeface="Calibri" panose="020F0502020204030204" pitchFamily="34" charset="0"/>
+              </a:defRPr>
+            </a:lvl5pPr>
+            <a:lvl6pPr marL="2514600" indent="-228600" eaLnBrk="0" fontAlgn="base" hangingPunct="0">
+              <a:spcBef>
+                <a:spcPct val="0"/>
+              </a:spcBef>
+              <a:spcAft>
+                <a:spcPct val="0"/>
+              </a:spcAft>
+              <a:defRPr>
+                <a:solidFill>
+                  <a:schemeClr val="tx1"/>
+                </a:solidFill>
+                <a:latin typeface="Calibri" panose="020F0502020204030204" pitchFamily="34" charset="0"/>
+              </a:defRPr>
+            </a:lvl6pPr>
+            <a:lvl7pPr marL="2971800" indent="-228600" eaLnBrk="0" fontAlgn="base" hangingPunct="0">
+              <a:spcBef>
+                <a:spcPct val="0"/>
+              </a:spcBef>
+              <a:spcAft>
+                <a:spcPct val="0"/>
+              </a:spcAft>
+              <a:defRPr>
+                <a:solidFill>
+                  <a:schemeClr val="tx1"/>
+                </a:solidFill>
+                <a:latin typeface="Calibri" panose="020F0502020204030204" pitchFamily="34" charset="0"/>
+              </a:defRPr>
+            </a:lvl7pPr>
+            <a:lvl8pPr marL="3429000" indent="-228600" eaLnBrk="0" fontAlgn="base" hangingPunct="0">
+              <a:spcBef>
+                <a:spcPct val="0"/>
+              </a:spcBef>
+              <a:spcAft>
+                <a:spcPct val="0"/>
+              </a:spcAft>
+              <a:defRPr>
+                <a:solidFill>
+                  <a:schemeClr val="tx1"/>
+                </a:solidFill>
+                <a:latin typeface="Calibri" panose="020F0502020204030204" pitchFamily="34" charset="0"/>
+              </a:defRPr>
+            </a:lvl8pPr>
+            <a:lvl9pPr marL="3886200" indent="-228600" eaLnBrk="0" fontAlgn="base" hangingPunct="0">
+              <a:spcBef>
+                <a:spcPct val="0"/>
+              </a:spcBef>
+              <a:spcAft>
+                <a:spcPct val="0"/>
+              </a:spcAft>
+              <a:defRPr>
+                <a:solidFill>
+                  <a:schemeClr val="tx1"/>
+                </a:solidFill>
+                <a:latin typeface="Calibri" panose="020F0502020204030204" pitchFamily="34" charset="0"/>
+              </a:defRPr>
+            </a:lvl9pPr>
+          </a:lstStyle>
+          <a:p>
+            <a:pPr algn="ctr" eaLnBrk="1" hangingPunct="1"/>
+            <a:r>
+              <a:rPr lang="en-US" altLang="en-US" sz="1200" dirty="0">
+                <a:latin typeface="Arial" panose="020B0604020202020204" pitchFamily="34" charset="0"/>
+                <a:ea typeface="Amazon Ember" panose="020B0603020204020204" pitchFamily="34" charset="0"/>
+                <a:cs typeface="Arial" panose="020B0604020202020204" pitchFamily="34" charset="0"/>
+              </a:rPr>
+              <a:t>AWS KMS</a:t>
+            </a:r>
+          </a:p>
+        </p:txBody>
+      </p:sp>
+      <p:cxnSp>
+        <p:nvCxnSpPr>
+          <p:cNvPr id="49" name="Straight Arrow Connector 48">
+            <a:extLst>
+              <a:ext uri="{FF2B5EF4-FFF2-40B4-BE49-F238E27FC236}">
+                <a16:creationId xmlns:a16="http://schemas.microsoft.com/office/drawing/2014/main" id="{0E9D442F-9C86-444F-8AF2-56267629C883}"/>
+              </a:ext>
+            </a:extLst>
+          </p:cNvPr>
+          <p:cNvCxnSpPr>
+            <a:cxnSpLocks/>
+            <a:stCxn id="162" idx="0"/>
+            <a:endCxn id="48" idx="2"/>
+          </p:cNvCxnSpPr>
+          <p:nvPr/>
+        </p:nvCxnSpPr>
+        <p:spPr>
+          <a:xfrm flipH="1" flipV="1">
+            <a:off x="8026172" y="3367651"/>
+            <a:ext cx="767" cy="295769"/>
+          </a:xfrm>
+          <a:prstGeom prst="straightConnector1">
+            <a:avLst/>
+          </a:prstGeom>
+          <a:ln w="12700">
+            <a:solidFill>
+              <a:schemeClr val="tx2"/>
+            </a:solidFill>
+            <a:headEnd type="none" w="med" len="sm"/>
+            <a:tailEnd type="arrow" w="med" len="sm"/>
+          </a:ln>
+        </p:spPr>
+        <p:style>
+          <a:lnRef idx="1">
+            <a:schemeClr val="accent1"/>
+          </a:lnRef>
+          <a:fillRef idx="0">
+            <a:schemeClr val="accent1"/>
+          </a:fillRef>
+          <a:effectRef idx="0">
+            <a:schemeClr val="accent1"/>
+          </a:effectRef>
+          <a:fontRef idx="minor">
+            <a:schemeClr val="tx1"/>
+          </a:fontRef>
+        </p:style>
+      </p:cxnSp>
     </p:spTree>
     <p:extLst>
       <p:ext uri="{BB962C8B-B14F-4D97-AF65-F5344CB8AC3E}">

</xml_diff>